<commit_message>
Came to a conclusion for the Project
</commit_message>
<xml_diff>
--- a/Documentation/Document File/StudentHub.pptx
+++ b/Documentation/Document File/StudentHub.pptx
@@ -16,6 +16,7 @@
     <p:sldId id="257" r:id="rId10"/>
     <p:sldId id="261" r:id="rId11"/>
     <p:sldId id="262" r:id="rId12"/>
+    <p:sldId id="264" r:id="rId13"/>
   </p:sldIdLst>
   <p:sldSz cx="12192000" cy="6858000"/>
   <p:notesSz cx="6858000" cy="9144000"/>
@@ -310,7 +311,7 @@
           <a:p>
             <a:fld id="{A5D554F9-75DE-4C99-8500-C23B28C1AE66}" type="datetimeFigureOut">
               <a:rPr lang="en-US" smtClean="0"/>
-              <a:t>7/16/2025</a:t>
+              <a:t>7/17/2025</a:t>
             </a:fld>
             <a:endParaRPr lang="en-US"/>
           </a:p>
@@ -648,7 +649,7 @@
           <a:p>
             <a:fld id="{A5D554F9-75DE-4C99-8500-C23B28C1AE66}" type="datetimeFigureOut">
               <a:rPr lang="en-US" smtClean="0"/>
-              <a:t>7/16/2025</a:t>
+              <a:t>7/17/2025</a:t>
             </a:fld>
             <a:endParaRPr lang="en-US"/>
           </a:p>
@@ -1049,7 +1050,7 @@
           <a:p>
             <a:fld id="{A5D554F9-75DE-4C99-8500-C23B28C1AE66}" type="datetimeFigureOut">
               <a:rPr lang="en-US" smtClean="0"/>
-              <a:t>7/16/2025</a:t>
+              <a:t>7/17/2025</a:t>
             </a:fld>
             <a:endParaRPr lang="en-US"/>
           </a:p>
@@ -1385,7 +1386,7 @@
           <a:p>
             <a:fld id="{A5D554F9-75DE-4C99-8500-C23B28C1AE66}" type="datetimeFigureOut">
               <a:rPr lang="en-US" smtClean="0"/>
-              <a:t>7/16/2025</a:t>
+              <a:t>7/17/2025</a:t>
             </a:fld>
             <a:endParaRPr lang="en-US"/>
           </a:p>
@@ -1705,7 +1706,7 @@
           <a:p>
             <a:fld id="{A5D554F9-75DE-4C99-8500-C23B28C1AE66}" type="datetimeFigureOut">
               <a:rPr lang="en-US" smtClean="0"/>
-              <a:t>7/16/2025</a:t>
+              <a:t>7/17/2025</a:t>
             </a:fld>
             <a:endParaRPr lang="en-US"/>
           </a:p>
@@ -2101,7 +2102,7 @@
           <a:p>
             <a:fld id="{A5D554F9-75DE-4C99-8500-C23B28C1AE66}" type="datetimeFigureOut">
               <a:rPr lang="en-US" smtClean="0"/>
-              <a:t>7/16/2025</a:t>
+              <a:t>7/17/2025</a:t>
             </a:fld>
             <a:endParaRPr lang="en-US"/>
           </a:p>
@@ -2358,7 +2359,7 @@
           <a:p>
             <a:fld id="{A5D554F9-75DE-4C99-8500-C23B28C1AE66}" type="datetimeFigureOut">
               <a:rPr lang="en-US" smtClean="0"/>
-              <a:t>7/16/2025</a:t>
+              <a:t>7/17/2025</a:t>
             </a:fld>
             <a:endParaRPr lang="en-US"/>
           </a:p>
@@ -2620,7 +2621,7 @@
           <a:p>
             <a:fld id="{A5D554F9-75DE-4C99-8500-C23B28C1AE66}" type="datetimeFigureOut">
               <a:rPr lang="en-US" smtClean="0"/>
-              <a:t>7/16/2025</a:t>
+              <a:t>7/17/2025</a:t>
             </a:fld>
             <a:endParaRPr lang="en-US"/>
           </a:p>
@@ -4172,7 +4173,7 @@
           <a:p>
             <a:fld id="{A5D554F9-75DE-4C99-8500-C23B28C1AE66}" type="datetimeFigureOut">
               <a:rPr lang="en-US" smtClean="0"/>
-              <a:t>7/16/2025</a:t>
+              <a:t>7/17/2025</a:t>
             </a:fld>
             <a:endParaRPr lang="en-US"/>
           </a:p>
@@ -5631,7 +5632,7 @@
           <a:p>
             <a:fld id="{A5D554F9-75DE-4C99-8500-C23B28C1AE66}" type="datetimeFigureOut">
               <a:rPr lang="en-US" smtClean="0"/>
-              <a:t>7/16/2025</a:t>
+              <a:t>7/17/2025</a:t>
             </a:fld>
             <a:endParaRPr lang="en-US"/>
           </a:p>
@@ -7139,7 +7140,7 @@
           <a:p>
             <a:fld id="{A5D554F9-75DE-4C99-8500-C23B28C1AE66}" type="datetimeFigureOut">
               <a:rPr lang="en-US" smtClean="0"/>
-              <a:t>7/16/2025</a:t>
+              <a:t>7/17/2025</a:t>
             </a:fld>
             <a:endParaRPr lang="en-US"/>
           </a:p>
@@ -7333,7 +7334,7 @@
           <a:p>
             <a:fld id="{A5D554F9-75DE-4C99-8500-C23B28C1AE66}" type="datetimeFigureOut">
               <a:rPr lang="en-US" smtClean="0"/>
-              <a:t>7/16/2025</a:t>
+              <a:t>7/17/2025</a:t>
             </a:fld>
             <a:endParaRPr lang="en-US"/>
           </a:p>
@@ -8922,7 +8923,7 @@
           <a:p>
             <a:fld id="{A5D554F9-75DE-4C99-8500-C23B28C1AE66}" type="datetimeFigureOut">
               <a:rPr lang="en-US" smtClean="0"/>
-              <a:t>7/16/2025</a:t>
+              <a:t>7/17/2025</a:t>
             </a:fld>
             <a:endParaRPr lang="en-US"/>
           </a:p>
@@ -10587,7 +10588,7 @@
           <a:p>
             <a:fld id="{A5D554F9-75DE-4C99-8500-C23B28C1AE66}" type="datetimeFigureOut">
               <a:rPr lang="en-US" smtClean="0"/>
-              <a:t>7/16/2025</a:t>
+              <a:t>7/17/2025</a:t>
             </a:fld>
             <a:endParaRPr lang="en-US"/>
           </a:p>
@@ -11985,7 +11986,7 @@
           <a:p>
             <a:fld id="{A5D554F9-75DE-4C99-8500-C23B28C1AE66}" type="datetimeFigureOut">
               <a:rPr lang="en-US" smtClean="0"/>
-              <a:t>7/16/2025</a:t>
+              <a:t>7/17/2025</a:t>
             </a:fld>
             <a:endParaRPr lang="en-US"/>
           </a:p>
@@ -12085,7 +12086,7 @@
           <a:p>
             <a:fld id="{A5D554F9-75DE-4C99-8500-C23B28C1AE66}" type="datetimeFigureOut">
               <a:rPr lang="en-US" smtClean="0"/>
-              <a:t>7/16/2025</a:t>
+              <a:t>7/17/2025</a:t>
             </a:fld>
             <a:endParaRPr lang="en-US"/>
           </a:p>
@@ -13611,7 +13612,7 @@
           <a:p>
             <a:fld id="{A5D554F9-75DE-4C99-8500-C23B28C1AE66}" type="datetimeFigureOut">
               <a:rPr lang="en-US" smtClean="0"/>
-              <a:t>7/16/2025</a:t>
+              <a:t>7/17/2025</a:t>
             </a:fld>
             <a:endParaRPr lang="en-US"/>
           </a:p>
@@ -15147,7 +15148,7 @@
           <a:p>
             <a:fld id="{A5D554F9-75DE-4C99-8500-C23B28C1AE66}" type="datetimeFigureOut">
               <a:rPr lang="en-US" smtClean="0"/>
-              <a:t>7/16/2025</a:t>
+              <a:t>7/17/2025</a:t>
             </a:fld>
             <a:endParaRPr lang="en-US"/>
           </a:p>
@@ -16602,7 +16603,7 @@
           <a:p>
             <a:fld id="{A5D554F9-75DE-4C99-8500-C23B28C1AE66}" type="datetimeFigureOut">
               <a:rPr lang="en-US" smtClean="0"/>
-              <a:t>7/16/2025</a:t>
+              <a:t>7/17/2025</a:t>
             </a:fld>
             <a:endParaRPr lang="en-US"/>
           </a:p>
@@ -18055,7 +18056,7 @@
           <a:p>
             <a:fld id="{A5D554F9-75DE-4C99-8500-C23B28C1AE66}" type="datetimeFigureOut">
               <a:rPr lang="en-US" smtClean="0"/>
-              <a:t>7/16/2025</a:t>
+              <a:t>7/17/2025</a:t>
             </a:fld>
             <a:endParaRPr lang="en-US"/>
           </a:p>
@@ -18871,7 +18872,7 @@
           <a:p>
             <a:fld id="{A5D554F9-75DE-4C99-8500-C23B28C1AE66}" type="datetimeFigureOut">
               <a:rPr lang="en-US" smtClean="0"/>
-              <a:t>7/16/2025</a:t>
+              <a:t>7/17/2025</a:t>
             </a:fld>
             <a:endParaRPr lang="en-US"/>
           </a:p>
@@ -19041,7 +19042,7 @@
           <a:p>
             <a:fld id="{A5D554F9-75DE-4C99-8500-C23B28C1AE66}" type="datetimeFigureOut">
               <a:rPr lang="en-US" smtClean="0"/>
-              <a:t>7/16/2025</a:t>
+              <a:t>7/17/2025</a:t>
             </a:fld>
             <a:endParaRPr lang="en-US"/>
           </a:p>
@@ -19288,7 +19289,7 @@
           <a:p>
             <a:fld id="{A5D554F9-75DE-4C99-8500-C23B28C1AE66}" type="datetimeFigureOut">
               <a:rPr lang="en-US" smtClean="0"/>
-              <a:t>7/16/2025</a:t>
+              <a:t>7/17/2025</a:t>
             </a:fld>
             <a:endParaRPr lang="en-US"/>
           </a:p>
@@ -19622,7 +19623,7 @@
           <a:p>
             <a:fld id="{A5D554F9-75DE-4C99-8500-C23B28C1AE66}" type="datetimeFigureOut">
               <a:rPr lang="en-US" smtClean="0"/>
-              <a:t>7/16/2025</a:t>
+              <a:t>7/17/2025</a:t>
             </a:fld>
             <a:endParaRPr lang="en-US"/>
           </a:p>
@@ -19854,7 +19855,7 @@
           <a:p>
             <a:fld id="{A5D554F9-75DE-4C99-8500-C23B28C1AE66}" type="datetimeFigureOut">
               <a:rPr lang="en-US" smtClean="0"/>
-              <a:t>7/16/2025</a:t>
+              <a:t>7/17/2025</a:t>
             </a:fld>
             <a:endParaRPr lang="en-US"/>
           </a:p>
@@ -20228,7 +20229,7 @@
           <a:p>
             <a:fld id="{A5D554F9-75DE-4C99-8500-C23B28C1AE66}" type="datetimeFigureOut">
               <a:rPr lang="en-US" smtClean="0"/>
-              <a:t>7/16/2025</a:t>
+              <a:t>7/17/2025</a:t>
             </a:fld>
             <a:endParaRPr lang="en-US"/>
           </a:p>
@@ -20351,7 +20352,7 @@
           <a:p>
             <a:fld id="{A5D554F9-75DE-4C99-8500-C23B28C1AE66}" type="datetimeFigureOut">
               <a:rPr lang="en-US" smtClean="0"/>
-              <a:t>7/16/2025</a:t>
+              <a:t>7/17/2025</a:t>
             </a:fld>
             <a:endParaRPr lang="en-US"/>
           </a:p>
@@ -20446,7 +20447,7 @@
           <a:p>
             <a:fld id="{A5D554F9-75DE-4C99-8500-C23B28C1AE66}" type="datetimeFigureOut">
               <a:rPr lang="en-US" smtClean="0"/>
-              <a:t>7/16/2025</a:t>
+              <a:t>7/17/2025</a:t>
             </a:fld>
             <a:endParaRPr lang="en-US"/>
           </a:p>
@@ -20701,7 +20702,7 @@
           <a:p>
             <a:fld id="{A5D554F9-75DE-4C99-8500-C23B28C1AE66}" type="datetimeFigureOut">
               <a:rPr lang="en-US" smtClean="0"/>
-              <a:t>7/16/2025</a:t>
+              <a:t>7/17/2025</a:t>
             </a:fld>
             <a:endParaRPr lang="en-US"/>
           </a:p>
@@ -21006,7 +21007,7 @@
           <a:p>
             <a:fld id="{A5D554F9-75DE-4C99-8500-C23B28C1AE66}" type="datetimeFigureOut">
               <a:rPr lang="en-US" smtClean="0"/>
-              <a:t>7/16/2025</a:t>
+              <a:t>7/17/2025</a:t>
             </a:fld>
             <a:endParaRPr lang="en-US"/>
           </a:p>
@@ -21215,7 +21216,7 @@
           <a:p>
             <a:fld id="{A5D554F9-75DE-4C99-8500-C23B28C1AE66}" type="datetimeFigureOut">
               <a:rPr lang="en-US" smtClean="0"/>
-              <a:t>7/16/2025</a:t>
+              <a:t>7/17/2025</a:t>
             </a:fld>
             <a:endParaRPr lang="en-US"/>
           </a:p>
@@ -21529,7 +21530,7 @@
           <a:p>
             <a:fld id="{A5D554F9-75DE-4C99-8500-C23B28C1AE66}" type="datetimeFigureOut">
               <a:rPr lang="en-US" smtClean="0"/>
-              <a:t>7/16/2025</a:t>
+              <a:t>7/17/2025</a:t>
             </a:fld>
             <a:endParaRPr lang="en-US"/>
           </a:p>
@@ -21862,7 +21863,7 @@
           <a:p>
             <a:fld id="{A5D554F9-75DE-4C99-8500-C23B28C1AE66}" type="datetimeFigureOut">
               <a:rPr lang="en-US" smtClean="0"/>
-              <a:t>7/16/2025</a:t>
+              <a:t>7/17/2025</a:t>
             </a:fld>
             <a:endParaRPr lang="en-US"/>
           </a:p>
@@ -22098,7 +22099,7 @@
           <a:p>
             <a:fld id="{A5D554F9-75DE-4C99-8500-C23B28C1AE66}" type="datetimeFigureOut">
               <a:rPr lang="en-US" smtClean="0"/>
-              <a:t>7/16/2025</a:t>
+              <a:t>7/17/2025</a:t>
             </a:fld>
             <a:endParaRPr lang="en-US"/>
           </a:p>
@@ -22499,7 +22500,7 @@
           <a:p>
             <a:fld id="{A5D554F9-75DE-4C99-8500-C23B28C1AE66}" type="datetimeFigureOut">
               <a:rPr lang="en-US" smtClean="0"/>
-              <a:t>7/16/2025</a:t>
+              <a:t>7/17/2025</a:t>
             </a:fld>
             <a:endParaRPr lang="en-US"/>
           </a:p>
@@ -22892,7 +22893,7 @@
           <a:p>
             <a:fld id="{A5D554F9-75DE-4C99-8500-C23B28C1AE66}" type="datetimeFigureOut">
               <a:rPr lang="en-US" smtClean="0"/>
-              <a:t>7/16/2025</a:t>
+              <a:t>7/17/2025</a:t>
             </a:fld>
             <a:endParaRPr lang="en-US"/>
           </a:p>
@@ -23062,7 +23063,7 @@
           <a:p>
             <a:fld id="{A5D554F9-75DE-4C99-8500-C23B28C1AE66}" type="datetimeFigureOut">
               <a:rPr lang="en-US" smtClean="0"/>
-              <a:t>7/16/2025</a:t>
+              <a:t>7/17/2025</a:t>
             </a:fld>
             <a:endParaRPr lang="en-US"/>
           </a:p>
@@ -23242,7 +23243,7 @@
           <a:p>
             <a:fld id="{A5D554F9-75DE-4C99-8500-C23B28C1AE66}" type="datetimeFigureOut">
               <a:rPr lang="en-US" smtClean="0"/>
-              <a:t>7/16/2025</a:t>
+              <a:t>7/17/2025</a:t>
             </a:fld>
             <a:endParaRPr lang="en-US"/>
           </a:p>
@@ -23353,7 +23354,7 @@
           <a:noFill/>
           <a:extLst>
             <a:ext uri="{909E8E84-426E-40dd-AFC4-6F175D3DCCD1}">
-              <a14:hiddenFill xmlns="" xmlns:a14="http://schemas.microsoft.com/office/drawing/2010/main">
+              <a14:hiddenFill xmlns:a14="http://schemas.microsoft.com/office/drawing/2010/main" xmlns="">
                 <a:solidFill>
                   <a:srgbClr val="FFFFFF"/>
                 </a:solidFill>
@@ -23413,7 +23414,7 @@
             </a:ln>
             <a:extLst>
               <a:ext uri="{91240B29-F687-4f45-9708-019B960494DF}">
-                <a14:hiddenLine xmlns="" xmlns:a14="http://schemas.microsoft.com/office/drawing/2010/main" w="9525">
+                <a14:hiddenLine xmlns:a14="http://schemas.microsoft.com/office/drawing/2010/main" xmlns="" w="9525">
                   <a:solidFill>
                     <a:srgbClr val="000000"/>
                   </a:solidFill>
@@ -23503,7 +23504,7 @@
             </a:ln>
             <a:extLst>
               <a:ext uri="{91240B29-F687-4f45-9708-019B960494DF}">
-                <a14:hiddenLine xmlns="" xmlns:a14="http://schemas.microsoft.com/office/drawing/2010/main" w="9525">
+                <a14:hiddenLine xmlns:a14="http://schemas.microsoft.com/office/drawing/2010/main" xmlns="" w="9525">
                   <a:solidFill>
                     <a:srgbClr val="000000"/>
                   </a:solidFill>
@@ -23593,7 +23594,7 @@
             </a:ln>
             <a:extLst>
               <a:ext uri="{91240B29-F687-4f45-9708-019B960494DF}">
-                <a14:hiddenLine xmlns="" xmlns:a14="http://schemas.microsoft.com/office/drawing/2010/main" w="9525">
+                <a14:hiddenLine xmlns:a14="http://schemas.microsoft.com/office/drawing/2010/main" xmlns="" w="9525">
                   <a:solidFill>
                     <a:srgbClr val="000000"/>
                   </a:solidFill>
@@ -23627,7 +23628,7 @@
             </a:ln>
             <a:extLst>
               <a:ext uri="{91240B29-F687-4f45-9708-019B960494DF}">
-                <a14:hiddenLine xmlns="" xmlns:a14="http://schemas.microsoft.com/office/drawing/2010/main" w="9525">
+                <a14:hiddenLine xmlns:a14="http://schemas.microsoft.com/office/drawing/2010/main" xmlns="" w="9525">
                   <a:solidFill>
                     <a:srgbClr val="000000"/>
                   </a:solidFill>
@@ -23717,7 +23718,7 @@
             </a:ln>
             <a:extLst>
               <a:ext uri="{91240B29-F687-4f45-9708-019B960494DF}">
-                <a14:hiddenLine xmlns="" xmlns:a14="http://schemas.microsoft.com/office/drawing/2010/main" w="9525">
+                <a14:hiddenLine xmlns:a14="http://schemas.microsoft.com/office/drawing/2010/main" xmlns="" w="9525">
                   <a:solidFill>
                     <a:srgbClr val="000000"/>
                   </a:solidFill>
@@ -23779,7 +23780,7 @@
             </a:ln>
             <a:extLst>
               <a:ext uri="{91240B29-F687-4f45-9708-019B960494DF}">
-                <a14:hiddenLine xmlns="" xmlns:a14="http://schemas.microsoft.com/office/drawing/2010/main" w="9525">
+                <a14:hiddenLine xmlns:a14="http://schemas.microsoft.com/office/drawing/2010/main" xmlns="" w="9525">
                   <a:solidFill>
                     <a:srgbClr val="000000"/>
                   </a:solidFill>
@@ -23841,7 +23842,7 @@
             </a:ln>
             <a:extLst>
               <a:ext uri="{91240B29-F687-4f45-9708-019B960494DF}">
-                <a14:hiddenLine xmlns="" xmlns:a14="http://schemas.microsoft.com/office/drawing/2010/main" w="9525">
+                <a14:hiddenLine xmlns:a14="http://schemas.microsoft.com/office/drawing/2010/main" xmlns="" w="9525">
                   <a:solidFill>
                     <a:srgbClr val="000000"/>
                   </a:solidFill>
@@ -23931,7 +23932,7 @@
             </a:ln>
             <a:extLst>
               <a:ext uri="{91240B29-F687-4f45-9708-019B960494DF}">
-                <a14:hiddenLine xmlns="" xmlns:a14="http://schemas.microsoft.com/office/drawing/2010/main" w="9525">
+                <a14:hiddenLine xmlns:a14="http://schemas.microsoft.com/office/drawing/2010/main" xmlns="" w="9525">
                   <a:solidFill>
                     <a:srgbClr val="000000"/>
                   </a:solidFill>
@@ -23993,7 +23994,7 @@
             </a:ln>
             <a:extLst>
               <a:ext uri="{91240B29-F687-4f45-9708-019B960494DF}">
-                <a14:hiddenLine xmlns="" xmlns:a14="http://schemas.microsoft.com/office/drawing/2010/main" w="9525">
+                <a14:hiddenLine xmlns:a14="http://schemas.microsoft.com/office/drawing/2010/main" xmlns="" w="9525">
                   <a:solidFill>
                     <a:srgbClr val="000000"/>
                   </a:solidFill>
@@ -24055,7 +24056,7 @@
             </a:ln>
             <a:extLst>
               <a:ext uri="{91240B29-F687-4f45-9708-019B960494DF}">
-                <a14:hiddenLine xmlns="" xmlns:a14="http://schemas.microsoft.com/office/drawing/2010/main" w="9525">
+                <a14:hiddenLine xmlns:a14="http://schemas.microsoft.com/office/drawing/2010/main" xmlns="" w="9525">
                   <a:solidFill>
                     <a:srgbClr val="000000"/>
                   </a:solidFill>
@@ -24145,7 +24146,7 @@
             </a:ln>
             <a:extLst>
               <a:ext uri="{91240B29-F687-4f45-9708-019B960494DF}">
-                <a14:hiddenLine xmlns="" xmlns:a14="http://schemas.microsoft.com/office/drawing/2010/main" w="9525">
+                <a14:hiddenLine xmlns:a14="http://schemas.microsoft.com/office/drawing/2010/main" xmlns="" w="9525">
                   <a:solidFill>
                     <a:srgbClr val="000000"/>
                   </a:solidFill>
@@ -24235,7 +24236,7 @@
             </a:ln>
             <a:extLst>
               <a:ext uri="{91240B29-F687-4f45-9708-019B960494DF}">
-                <a14:hiddenLine xmlns="" xmlns:a14="http://schemas.microsoft.com/office/drawing/2010/main" w="9525">
+                <a14:hiddenLine xmlns:a14="http://schemas.microsoft.com/office/drawing/2010/main" xmlns="" w="9525">
                   <a:solidFill>
                     <a:srgbClr val="000000"/>
                   </a:solidFill>
@@ -24297,7 +24298,7 @@
             </a:ln>
             <a:extLst>
               <a:ext uri="{91240B29-F687-4f45-9708-019B960494DF}">
-                <a14:hiddenLine xmlns="" xmlns:a14="http://schemas.microsoft.com/office/drawing/2010/main" w="9525">
+                <a14:hiddenLine xmlns:a14="http://schemas.microsoft.com/office/drawing/2010/main" xmlns="" w="9525">
                   <a:solidFill>
                     <a:srgbClr val="000000"/>
                   </a:solidFill>
@@ -24407,7 +24408,7 @@
             </a:ln>
             <a:extLst>
               <a:ext uri="{91240B29-F687-4f45-9708-019B960494DF}">
-                <a14:hiddenLine xmlns="" xmlns:a14="http://schemas.microsoft.com/office/drawing/2010/main" w="9525">
+                <a14:hiddenLine xmlns:a14="http://schemas.microsoft.com/office/drawing/2010/main" xmlns="" w="9525">
                   <a:solidFill>
                     <a:srgbClr val="000000"/>
                   </a:solidFill>
@@ -24469,7 +24470,7 @@
             </a:ln>
             <a:extLst>
               <a:ext uri="{91240B29-F687-4f45-9708-019B960494DF}">
-                <a14:hiddenLine xmlns="" xmlns:a14="http://schemas.microsoft.com/office/drawing/2010/main" w="9525">
+                <a14:hiddenLine xmlns:a14="http://schemas.microsoft.com/office/drawing/2010/main" xmlns="" w="9525">
                   <a:solidFill>
                     <a:srgbClr val="000000"/>
                   </a:solidFill>
@@ -24559,7 +24560,7 @@
             </a:ln>
             <a:extLst>
               <a:ext uri="{91240B29-F687-4f45-9708-019B960494DF}">
-                <a14:hiddenLine xmlns="" xmlns:a14="http://schemas.microsoft.com/office/drawing/2010/main" w="9525">
+                <a14:hiddenLine xmlns:a14="http://schemas.microsoft.com/office/drawing/2010/main" xmlns="" w="9525">
                   <a:solidFill>
                     <a:srgbClr val="000000"/>
                   </a:solidFill>
@@ -24649,7 +24650,7 @@
             </a:ln>
             <a:extLst>
               <a:ext uri="{91240B29-F687-4f45-9708-019B960494DF}">
-                <a14:hiddenLine xmlns="" xmlns:a14="http://schemas.microsoft.com/office/drawing/2010/main" w="9525">
+                <a14:hiddenLine xmlns:a14="http://schemas.microsoft.com/office/drawing/2010/main" xmlns="" w="9525">
                   <a:solidFill>
                     <a:srgbClr val="000000"/>
                   </a:solidFill>
@@ -24711,7 +24712,7 @@
             </a:ln>
             <a:extLst>
               <a:ext uri="{91240B29-F687-4f45-9708-019B960494DF}">
-                <a14:hiddenLine xmlns="" xmlns:a14="http://schemas.microsoft.com/office/drawing/2010/main" w="9525">
+                <a14:hiddenLine xmlns:a14="http://schemas.microsoft.com/office/drawing/2010/main" xmlns="" w="9525">
                   <a:solidFill>
                     <a:srgbClr val="000000"/>
                   </a:solidFill>
@@ -24801,7 +24802,7 @@
             </a:ln>
             <a:extLst>
               <a:ext uri="{91240B29-F687-4f45-9708-019B960494DF}">
-                <a14:hiddenLine xmlns="" xmlns:a14="http://schemas.microsoft.com/office/drawing/2010/main" w="9525">
+                <a14:hiddenLine xmlns:a14="http://schemas.microsoft.com/office/drawing/2010/main" xmlns="" w="9525">
                   <a:solidFill>
                     <a:srgbClr val="000000"/>
                   </a:solidFill>
@@ -24891,7 +24892,7 @@
             </a:ln>
             <a:extLst>
               <a:ext uri="{91240B29-F687-4f45-9708-019B960494DF}">
-                <a14:hiddenLine xmlns="" xmlns:a14="http://schemas.microsoft.com/office/drawing/2010/main" w="9525">
+                <a14:hiddenLine xmlns:a14="http://schemas.microsoft.com/office/drawing/2010/main" xmlns="" w="9525">
                   <a:solidFill>
                     <a:srgbClr val="000000"/>
                   </a:solidFill>
@@ -24947,7 +24948,7 @@
             </a:ln>
             <a:extLst>
               <a:ext uri="{91240B29-F687-4f45-9708-019B960494DF}">
-                <a14:hiddenLine xmlns="" xmlns:a14="http://schemas.microsoft.com/office/drawing/2010/main" w="9525">
+                <a14:hiddenLine xmlns:a14="http://schemas.microsoft.com/office/drawing/2010/main" xmlns="" w="9525">
                   <a:solidFill>
                     <a:srgbClr val="000000"/>
                   </a:solidFill>
@@ -25037,7 +25038,7 @@
             </a:ln>
             <a:extLst>
               <a:ext uri="{91240B29-F687-4f45-9708-019B960494DF}">
-                <a14:hiddenLine xmlns="" xmlns:a14="http://schemas.microsoft.com/office/drawing/2010/main" w="9525">
+                <a14:hiddenLine xmlns:a14="http://schemas.microsoft.com/office/drawing/2010/main" xmlns="" w="9525">
                   <a:solidFill>
                     <a:srgbClr val="000000"/>
                   </a:solidFill>
@@ -25093,7 +25094,7 @@
             </a:ln>
             <a:extLst>
               <a:ext uri="{91240B29-F687-4f45-9708-019B960494DF}">
-                <a14:hiddenLine xmlns="" xmlns:a14="http://schemas.microsoft.com/office/drawing/2010/main" w="9525">
+                <a14:hiddenLine xmlns:a14="http://schemas.microsoft.com/office/drawing/2010/main" xmlns="" w="9525">
                   <a:solidFill>
                     <a:srgbClr val="000000"/>
                   </a:solidFill>
@@ -25183,7 +25184,7 @@
             </a:ln>
             <a:extLst>
               <a:ext uri="{91240B29-F687-4f45-9708-019B960494DF}">
-                <a14:hiddenLine xmlns="" xmlns:a14="http://schemas.microsoft.com/office/drawing/2010/main" w="9525">
+                <a14:hiddenLine xmlns:a14="http://schemas.microsoft.com/office/drawing/2010/main" xmlns="" w="9525">
                   <a:solidFill>
                     <a:srgbClr val="000000"/>
                   </a:solidFill>
@@ -25251,7 +25252,7 @@
             </a:ln>
             <a:extLst>
               <a:ext uri="{91240B29-F687-4f45-9708-019B960494DF}">
-                <a14:hiddenLine xmlns="" xmlns:a14="http://schemas.microsoft.com/office/drawing/2010/main" w="9525">
+                <a14:hiddenLine xmlns:a14="http://schemas.microsoft.com/office/drawing/2010/main" xmlns="" w="9525">
                   <a:solidFill>
                     <a:srgbClr val="000000"/>
                   </a:solidFill>
@@ -25341,7 +25342,7 @@
             </a:ln>
             <a:extLst>
               <a:ext uri="{91240B29-F687-4f45-9708-019B960494DF}">
-                <a14:hiddenLine xmlns="" xmlns:a14="http://schemas.microsoft.com/office/drawing/2010/main" w="9525">
+                <a14:hiddenLine xmlns:a14="http://schemas.microsoft.com/office/drawing/2010/main" xmlns="" w="9525">
                   <a:solidFill>
                     <a:srgbClr val="000000"/>
                   </a:solidFill>
@@ -25409,7 +25410,7 @@
             </a:ln>
             <a:extLst>
               <a:ext uri="{91240B29-F687-4f45-9708-019B960494DF}">
-                <a14:hiddenLine xmlns="" xmlns:a14="http://schemas.microsoft.com/office/drawing/2010/main" w="9525">
+                <a14:hiddenLine xmlns:a14="http://schemas.microsoft.com/office/drawing/2010/main" xmlns="" w="9525">
                   <a:solidFill>
                     <a:srgbClr val="000000"/>
                   </a:solidFill>
@@ -25499,7 +25500,7 @@
             </a:ln>
             <a:extLst>
               <a:ext uri="{91240B29-F687-4f45-9708-019B960494DF}">
-                <a14:hiddenLine xmlns="" xmlns:a14="http://schemas.microsoft.com/office/drawing/2010/main" w="9525">
+                <a14:hiddenLine xmlns:a14="http://schemas.microsoft.com/office/drawing/2010/main" xmlns="" w="9525">
                   <a:solidFill>
                     <a:srgbClr val="000000"/>
                   </a:solidFill>
@@ -25533,7 +25534,7 @@
             </a:ln>
             <a:extLst>
               <a:ext uri="{91240B29-F687-4f45-9708-019B960494DF}">
-                <a14:hiddenLine xmlns="" xmlns:a14="http://schemas.microsoft.com/office/drawing/2010/main" w="9525">
+                <a14:hiddenLine xmlns:a14="http://schemas.microsoft.com/office/drawing/2010/main" xmlns="" w="9525">
                   <a:solidFill>
                     <a:srgbClr val="000000"/>
                   </a:solidFill>
@@ -25623,7 +25624,7 @@
             </a:ln>
             <a:extLst>
               <a:ext uri="{91240B29-F687-4f45-9708-019B960494DF}">
-                <a14:hiddenLine xmlns="" xmlns:a14="http://schemas.microsoft.com/office/drawing/2010/main" w="9525">
+                <a14:hiddenLine xmlns:a14="http://schemas.microsoft.com/office/drawing/2010/main" xmlns="" w="9525">
                   <a:solidFill>
                     <a:srgbClr val="000000"/>
                   </a:solidFill>
@@ -25685,7 +25686,7 @@
             </a:ln>
             <a:extLst>
               <a:ext uri="{91240B29-F687-4f45-9708-019B960494DF}">
-                <a14:hiddenLine xmlns="" xmlns:a14="http://schemas.microsoft.com/office/drawing/2010/main" w="9525">
+                <a14:hiddenLine xmlns:a14="http://schemas.microsoft.com/office/drawing/2010/main" xmlns="" w="9525">
                   <a:solidFill>
                     <a:srgbClr val="000000"/>
                   </a:solidFill>
@@ -25747,7 +25748,7 @@
             </a:ln>
             <a:extLst>
               <a:ext uri="{91240B29-F687-4f45-9708-019B960494DF}">
-                <a14:hiddenLine xmlns="" xmlns:a14="http://schemas.microsoft.com/office/drawing/2010/main" w="9525">
+                <a14:hiddenLine xmlns:a14="http://schemas.microsoft.com/office/drawing/2010/main" xmlns="" w="9525">
                   <a:solidFill>
                     <a:srgbClr val="000000"/>
                   </a:solidFill>
@@ -25837,7 +25838,7 @@
             </a:ln>
             <a:extLst>
               <a:ext uri="{91240B29-F687-4f45-9708-019B960494DF}">
-                <a14:hiddenLine xmlns="" xmlns:a14="http://schemas.microsoft.com/office/drawing/2010/main" w="9525">
+                <a14:hiddenLine xmlns:a14="http://schemas.microsoft.com/office/drawing/2010/main" xmlns="" w="9525">
                   <a:solidFill>
                     <a:srgbClr val="000000"/>
                   </a:solidFill>
@@ -25905,7 +25906,7 @@
             </a:ln>
             <a:extLst>
               <a:ext uri="{91240B29-F687-4f45-9708-019B960494DF}">
-                <a14:hiddenLine xmlns="" xmlns:a14="http://schemas.microsoft.com/office/drawing/2010/main" w="9525">
+                <a14:hiddenLine xmlns:a14="http://schemas.microsoft.com/office/drawing/2010/main" xmlns="" w="9525">
                   <a:solidFill>
                     <a:srgbClr val="000000"/>
                   </a:solidFill>
@@ -25967,7 +25968,7 @@
             </a:ln>
             <a:extLst>
               <a:ext uri="{91240B29-F687-4f45-9708-019B960494DF}">
-                <a14:hiddenLine xmlns="" xmlns:a14="http://schemas.microsoft.com/office/drawing/2010/main" w="9525">
+                <a14:hiddenLine xmlns:a14="http://schemas.microsoft.com/office/drawing/2010/main" xmlns="" w="9525">
                   <a:solidFill>
                     <a:srgbClr val="000000"/>
                   </a:solidFill>
@@ -26057,7 +26058,7 @@
             </a:ln>
             <a:extLst>
               <a:ext uri="{91240B29-F687-4f45-9708-019B960494DF}">
-                <a14:hiddenLine xmlns="" xmlns:a14="http://schemas.microsoft.com/office/drawing/2010/main" w="9525">
+                <a14:hiddenLine xmlns:a14="http://schemas.microsoft.com/office/drawing/2010/main" xmlns="" w="9525">
                   <a:solidFill>
                     <a:srgbClr val="000000"/>
                   </a:solidFill>
@@ -26119,7 +26120,7 @@
             </a:ln>
             <a:extLst>
               <a:ext uri="{91240B29-F687-4f45-9708-019B960494DF}">
-                <a14:hiddenLine xmlns="" xmlns:a14="http://schemas.microsoft.com/office/drawing/2010/main" w="9525">
+                <a14:hiddenLine xmlns:a14="http://schemas.microsoft.com/office/drawing/2010/main" xmlns="" w="9525">
                   <a:solidFill>
                     <a:srgbClr val="000000"/>
                   </a:solidFill>
@@ -26209,7 +26210,7 @@
             </a:ln>
             <a:extLst>
               <a:ext uri="{91240B29-F687-4f45-9708-019B960494DF}">
-                <a14:hiddenLine xmlns="" xmlns:a14="http://schemas.microsoft.com/office/drawing/2010/main" w="9525">
+                <a14:hiddenLine xmlns:a14="http://schemas.microsoft.com/office/drawing/2010/main" xmlns="" w="9525">
                   <a:solidFill>
                     <a:srgbClr val="000000"/>
                   </a:solidFill>
@@ -26271,7 +26272,7 @@
             </a:ln>
             <a:extLst>
               <a:ext uri="{91240B29-F687-4f45-9708-019B960494DF}">
-                <a14:hiddenLine xmlns="" xmlns:a14="http://schemas.microsoft.com/office/drawing/2010/main" w="9525">
+                <a14:hiddenLine xmlns:a14="http://schemas.microsoft.com/office/drawing/2010/main" xmlns="" w="9525">
                   <a:solidFill>
                     <a:srgbClr val="000000"/>
                   </a:solidFill>
@@ -26361,7 +26362,7 @@
             </a:ln>
             <a:extLst>
               <a:ext uri="{91240B29-F687-4f45-9708-019B960494DF}">
-                <a14:hiddenLine xmlns="" xmlns:a14="http://schemas.microsoft.com/office/drawing/2010/main" w="9525">
+                <a14:hiddenLine xmlns:a14="http://schemas.microsoft.com/office/drawing/2010/main" xmlns="" w="9525">
                   <a:solidFill>
                     <a:srgbClr val="000000"/>
                   </a:solidFill>
@@ -26395,7 +26396,7 @@
             </a:ln>
             <a:extLst>
               <a:ext uri="{91240B29-F687-4f45-9708-019B960494DF}">
-                <a14:hiddenLine xmlns="" xmlns:a14="http://schemas.microsoft.com/office/drawing/2010/main" w="9525">
+                <a14:hiddenLine xmlns:a14="http://schemas.microsoft.com/office/drawing/2010/main" xmlns="" w="9525">
                   <a:solidFill>
                     <a:srgbClr val="000000"/>
                   </a:solidFill>
@@ -26460,7 +26461,7 @@
             </a:ln>
             <a:extLst>
               <a:ext uri="{91240B29-F687-4f45-9708-019B960494DF}">
-                <a14:hiddenLine xmlns="" xmlns:a14="http://schemas.microsoft.com/office/drawing/2010/main" w="9525">
+                <a14:hiddenLine xmlns:a14="http://schemas.microsoft.com/office/drawing/2010/main" xmlns="" w="9525">
                   <a:solidFill>
                     <a:srgbClr val="000000"/>
                   </a:solidFill>
@@ -26550,7 +26551,7 @@
             </a:ln>
             <a:extLst>
               <a:ext uri="{91240B29-F687-4f45-9708-019B960494DF}">
-                <a14:hiddenLine xmlns="" xmlns:a14="http://schemas.microsoft.com/office/drawing/2010/main" w="9525">
+                <a14:hiddenLine xmlns:a14="http://schemas.microsoft.com/office/drawing/2010/main" xmlns="" w="9525">
                   <a:solidFill>
                     <a:srgbClr val="000000"/>
                   </a:solidFill>
@@ -26612,7 +26613,7 @@
             </a:ln>
             <a:extLst>
               <a:ext uri="{91240B29-F687-4f45-9708-019B960494DF}">
-                <a14:hiddenLine xmlns="" xmlns:a14="http://schemas.microsoft.com/office/drawing/2010/main" w="9525">
+                <a14:hiddenLine xmlns:a14="http://schemas.microsoft.com/office/drawing/2010/main" xmlns="" w="9525">
                   <a:solidFill>
                     <a:srgbClr val="000000"/>
                   </a:solidFill>
@@ -26702,7 +26703,7 @@
             </a:ln>
             <a:extLst>
               <a:ext uri="{91240B29-F687-4f45-9708-019B960494DF}">
-                <a14:hiddenLine xmlns="" xmlns:a14="http://schemas.microsoft.com/office/drawing/2010/main" w="9525">
+                <a14:hiddenLine xmlns:a14="http://schemas.microsoft.com/office/drawing/2010/main" xmlns="" w="9525">
                   <a:solidFill>
                     <a:srgbClr val="000000"/>
                   </a:solidFill>
@@ -26792,7 +26793,7 @@
             </a:ln>
             <a:extLst>
               <a:ext uri="{91240B29-F687-4f45-9708-019B960494DF}">
-                <a14:hiddenLine xmlns="" xmlns:a14="http://schemas.microsoft.com/office/drawing/2010/main" w="9525">
+                <a14:hiddenLine xmlns:a14="http://schemas.microsoft.com/office/drawing/2010/main" xmlns="" w="9525">
                   <a:solidFill>
                     <a:srgbClr val="000000"/>
                   </a:solidFill>
@@ -26857,7 +26858,7 @@
             </a:ln>
             <a:extLst>
               <a:ext uri="{91240B29-F687-4f45-9708-019B960494DF}">
-                <a14:hiddenLine xmlns="" xmlns:a14="http://schemas.microsoft.com/office/drawing/2010/main" w="9525">
+                <a14:hiddenLine xmlns:a14="http://schemas.microsoft.com/office/drawing/2010/main" xmlns="" w="9525">
                   <a:solidFill>
                     <a:srgbClr val="000000"/>
                   </a:solidFill>
@@ -26919,7 +26920,7 @@
             </a:ln>
             <a:extLst>
               <a:ext uri="{91240B29-F687-4f45-9708-019B960494DF}">
-                <a14:hiddenLine xmlns="" xmlns:a14="http://schemas.microsoft.com/office/drawing/2010/main" w="9525">
+                <a14:hiddenLine xmlns:a14="http://schemas.microsoft.com/office/drawing/2010/main" xmlns="" w="9525">
                   <a:solidFill>
                     <a:srgbClr val="000000"/>
                   </a:solidFill>
@@ -27009,7 +27010,7 @@
             </a:ln>
             <a:extLst>
               <a:ext uri="{91240B29-F687-4f45-9708-019B960494DF}">
-                <a14:hiddenLine xmlns="" xmlns:a14="http://schemas.microsoft.com/office/drawing/2010/main" w="9525">
+                <a14:hiddenLine xmlns:a14="http://schemas.microsoft.com/office/drawing/2010/main" xmlns="" w="9525">
                   <a:solidFill>
                     <a:srgbClr val="000000"/>
                   </a:solidFill>
@@ -27099,7 +27100,7 @@
             </a:ln>
             <a:extLst>
               <a:ext uri="{91240B29-F687-4f45-9708-019B960494DF}">
-                <a14:hiddenLine xmlns="" xmlns:a14="http://schemas.microsoft.com/office/drawing/2010/main" w="9525">
+                <a14:hiddenLine xmlns:a14="http://schemas.microsoft.com/office/drawing/2010/main" xmlns="" w="9525">
                   <a:solidFill>
                     <a:srgbClr val="000000"/>
                   </a:solidFill>
@@ -27161,7 +27162,7 @@
             </a:ln>
             <a:extLst>
               <a:ext uri="{91240B29-F687-4f45-9708-019B960494DF}">
-                <a14:hiddenLine xmlns="" xmlns:a14="http://schemas.microsoft.com/office/drawing/2010/main" w="9525">
+                <a14:hiddenLine xmlns:a14="http://schemas.microsoft.com/office/drawing/2010/main" xmlns="" w="9525">
                   <a:solidFill>
                     <a:srgbClr val="000000"/>
                   </a:solidFill>
@@ -27281,7 +27282,7 @@
             </a:ln>
             <a:extLst>
               <a:ext uri="{91240B29-F687-4f45-9708-019B960494DF}">
-                <a14:hiddenLine xmlns="" xmlns:a14="http://schemas.microsoft.com/office/drawing/2010/main" w="9525">
+                <a14:hiddenLine xmlns:a14="http://schemas.microsoft.com/office/drawing/2010/main" xmlns="" w="9525">
                   <a:solidFill>
                     <a:srgbClr val="000000"/>
                   </a:solidFill>
@@ -27349,7 +27350,7 @@
             </a:ln>
             <a:extLst>
               <a:ext uri="{91240B29-F687-4f45-9708-019B960494DF}">
-                <a14:hiddenLine xmlns="" xmlns:a14="http://schemas.microsoft.com/office/drawing/2010/main" w="9525">
+                <a14:hiddenLine xmlns:a14="http://schemas.microsoft.com/office/drawing/2010/main" xmlns="" w="9525">
                   <a:solidFill>
                     <a:srgbClr val="000000"/>
                   </a:solidFill>
@@ -27439,7 +27440,7 @@
             </a:ln>
             <a:extLst>
               <a:ext uri="{91240B29-F687-4f45-9708-019B960494DF}">
-                <a14:hiddenLine xmlns="" xmlns:a14="http://schemas.microsoft.com/office/drawing/2010/main" w="9525">
+                <a14:hiddenLine xmlns:a14="http://schemas.microsoft.com/office/drawing/2010/main" xmlns="" w="9525">
                   <a:solidFill>
                     <a:srgbClr val="000000"/>
                   </a:solidFill>
@@ -27579,7 +27580,7 @@
           <a:p>
             <a:fld id="{A5D554F9-75DE-4C99-8500-C23B28C1AE66}" type="datetimeFigureOut">
               <a:rPr lang="en-US" smtClean="0"/>
-              <a:t>7/16/2025</a:t>
+              <a:t>7/17/2025</a:t>
             </a:fld>
             <a:endParaRPr lang="en-US"/>
           </a:p>
@@ -27759,7 +27760,7 @@
           <a:p>
             <a:fld id="{A5D554F9-75DE-4C99-8500-C23B28C1AE66}" type="datetimeFigureOut">
               <a:rPr lang="en-US" smtClean="0"/>
-              <a:t>7/16/2025</a:t>
+              <a:t>7/17/2025</a:t>
             </a:fld>
             <a:endParaRPr lang="en-US"/>
           </a:p>
@@ -28009,7 +28010,7 @@
           <a:p>
             <a:fld id="{A5D554F9-75DE-4C99-8500-C23B28C1AE66}" type="datetimeFigureOut">
               <a:rPr lang="en-US" smtClean="0"/>
-              <a:t>7/16/2025</a:t>
+              <a:t>7/17/2025</a:t>
             </a:fld>
             <a:endParaRPr lang="en-US"/>
           </a:p>
@@ -28241,7 +28242,7 @@
           <a:p>
             <a:fld id="{A5D554F9-75DE-4C99-8500-C23B28C1AE66}" type="datetimeFigureOut">
               <a:rPr lang="en-US" smtClean="0"/>
-              <a:t>7/16/2025</a:t>
+              <a:t>7/17/2025</a:t>
             </a:fld>
             <a:endParaRPr lang="en-US"/>
           </a:p>
@@ -28622,7 +28623,7 @@
           <a:p>
             <a:fld id="{A5D554F9-75DE-4C99-8500-C23B28C1AE66}" type="datetimeFigureOut">
               <a:rPr lang="en-US" smtClean="0"/>
-              <a:t>7/16/2025</a:t>
+              <a:t>7/17/2025</a:t>
             </a:fld>
             <a:endParaRPr lang="en-US"/>
           </a:p>
@@ -28740,7 +28741,7 @@
           <a:p>
             <a:fld id="{A5D554F9-75DE-4C99-8500-C23B28C1AE66}" type="datetimeFigureOut">
               <a:rPr lang="en-US" smtClean="0"/>
-              <a:t>7/16/2025</a:t>
+              <a:t>7/17/2025</a:t>
             </a:fld>
             <a:endParaRPr lang="en-US"/>
           </a:p>
@@ -29110,7 +29111,7 @@
           <a:p>
             <a:fld id="{A5D554F9-75DE-4C99-8500-C23B28C1AE66}" type="datetimeFigureOut">
               <a:rPr lang="en-US" smtClean="0"/>
-              <a:t>7/16/2025</a:t>
+              <a:t>7/17/2025</a:t>
             </a:fld>
             <a:endParaRPr lang="en-US"/>
           </a:p>
@@ -29292,7 +29293,7 @@
           <a:p>
             <a:fld id="{A5D554F9-75DE-4C99-8500-C23B28C1AE66}" type="datetimeFigureOut">
               <a:rPr lang="en-US" smtClean="0"/>
-              <a:t>7/16/2025</a:t>
+              <a:t>7/17/2025</a:t>
             </a:fld>
             <a:endParaRPr lang="en-US"/>
           </a:p>
@@ -29541,7 +29542,7 @@
           <a:p>
             <a:fld id="{A5D554F9-75DE-4C99-8500-C23B28C1AE66}" type="datetimeFigureOut">
               <a:rPr lang="en-US" smtClean="0"/>
-              <a:t>7/16/2025</a:t>
+              <a:t>7/17/2025</a:t>
             </a:fld>
             <a:endParaRPr lang="en-US"/>
           </a:p>
@@ -29821,7 +29822,7 @@
           <a:p>
             <a:fld id="{A5D554F9-75DE-4C99-8500-C23B28C1AE66}" type="datetimeFigureOut">
               <a:rPr lang="en-US" smtClean="0"/>
-              <a:t>7/16/2025</a:t>
+              <a:t>7/17/2025</a:t>
             </a:fld>
             <a:endParaRPr lang="en-US"/>
           </a:p>
@@ -30078,7 +30079,7 @@
           <a:p>
             <a:fld id="{A5D554F9-75DE-4C99-8500-C23B28C1AE66}" type="datetimeFigureOut">
               <a:rPr lang="en-US" smtClean="0"/>
-              <a:t>7/16/2025</a:t>
+              <a:t>7/17/2025</a:t>
             </a:fld>
             <a:endParaRPr lang="en-US"/>
           </a:p>
@@ -30274,7 +30275,7 @@
           <a:p>
             <a:fld id="{A5D554F9-75DE-4C99-8500-C23B28C1AE66}" type="datetimeFigureOut">
               <a:rPr lang="en-US" smtClean="0"/>
-              <a:t>7/16/2025</a:t>
+              <a:t>7/17/2025</a:t>
             </a:fld>
             <a:endParaRPr lang="en-US"/>
           </a:p>
@@ -30537,7 +30538,7 @@
           <a:p>
             <a:fld id="{A5D554F9-75DE-4C99-8500-C23B28C1AE66}" type="datetimeFigureOut">
               <a:rPr lang="en-US" smtClean="0"/>
-              <a:t>7/16/2025</a:t>
+              <a:t>7/17/2025</a:t>
             </a:fld>
             <a:endParaRPr lang="en-US"/>
           </a:p>
@@ -30971,7 +30972,7 @@
           <a:p>
             <a:fld id="{A5D554F9-75DE-4C99-8500-C23B28C1AE66}" type="datetimeFigureOut">
               <a:rPr lang="en-US" smtClean="0"/>
-              <a:t>7/16/2025</a:t>
+              <a:t>7/17/2025</a:t>
             </a:fld>
             <a:endParaRPr lang="en-US"/>
           </a:p>
@@ -31517,7 +31518,7 @@
           <a:p>
             <a:fld id="{A5D554F9-75DE-4C99-8500-C23B28C1AE66}" type="datetimeFigureOut">
               <a:rPr lang="en-US" smtClean="0"/>
-              <a:t>7/16/2025</a:t>
+              <a:t>7/17/2025</a:t>
             </a:fld>
             <a:endParaRPr lang="en-US"/>
           </a:p>
@@ -32237,7 +32238,7 @@
           <a:p>
             <a:fld id="{A5D554F9-75DE-4C99-8500-C23B28C1AE66}" type="datetimeFigureOut">
               <a:rPr lang="en-US" smtClean="0"/>
-              <a:t>7/16/2025</a:t>
+              <a:t>7/17/2025</a:t>
             </a:fld>
             <a:endParaRPr lang="en-US"/>
           </a:p>
@@ -32407,7 +32408,7 @@
           <a:p>
             <a:fld id="{A5D554F9-75DE-4C99-8500-C23B28C1AE66}" type="datetimeFigureOut">
               <a:rPr lang="en-US" smtClean="0"/>
-              <a:t>7/16/2025</a:t>
+              <a:t>7/17/2025</a:t>
             </a:fld>
             <a:endParaRPr lang="en-US"/>
           </a:p>
@@ -32525,7 +32526,7 @@
           <a:p>
             <a:fld id="{A5D554F9-75DE-4C99-8500-C23B28C1AE66}" type="datetimeFigureOut">
               <a:rPr lang="en-US" smtClean="0"/>
-              <a:t>7/16/2025</a:t>
+              <a:t>7/17/2025</a:t>
             </a:fld>
             <a:endParaRPr lang="en-US"/>
           </a:p>
@@ -32787,7 +32788,7 @@
           <a:p>
             <a:fld id="{A5D554F9-75DE-4C99-8500-C23B28C1AE66}" type="datetimeFigureOut">
               <a:rPr lang="en-US" smtClean="0"/>
-              <a:t>7/16/2025</a:t>
+              <a:t>7/17/2025</a:t>
             </a:fld>
             <a:endParaRPr lang="en-US"/>
           </a:p>
@@ -32882,7 +32883,7 @@
           <a:p>
             <a:fld id="{A5D554F9-75DE-4C99-8500-C23B28C1AE66}" type="datetimeFigureOut">
               <a:rPr lang="en-US" smtClean="0"/>
-              <a:t>7/16/2025</a:t>
+              <a:t>7/17/2025</a:t>
             </a:fld>
             <a:endParaRPr lang="en-US"/>
           </a:p>
@@ -33215,7 +33216,7 @@
           <a:p>
             <a:fld id="{A5D554F9-75DE-4C99-8500-C23B28C1AE66}" type="datetimeFigureOut">
               <a:rPr lang="en-US" smtClean="0"/>
-              <a:t>7/16/2025</a:t>
+              <a:t>7/17/2025</a:t>
             </a:fld>
             <a:endParaRPr lang="en-US"/>
           </a:p>
@@ -33560,7 +33561,7 @@
           <a:p>
             <a:fld id="{A5D554F9-75DE-4C99-8500-C23B28C1AE66}" type="datetimeFigureOut">
               <a:rPr lang="en-US" smtClean="0"/>
-              <a:t>7/16/2025</a:t>
+              <a:t>7/17/2025</a:t>
             </a:fld>
             <a:endParaRPr lang="en-US"/>
           </a:p>
@@ -35677,7 +35678,7 @@
           <a:p>
             <a:fld id="{A5D554F9-75DE-4C99-8500-C23B28C1AE66}" type="datetimeFigureOut">
               <a:rPr lang="en-US" smtClean="0"/>
-              <a:t>7/16/2025</a:t>
+              <a:t>7/17/2025</a:t>
             </a:fld>
             <a:endParaRPr lang="en-US"/>
           </a:p>
@@ -36330,7 +36331,7 @@
           <a:p>
             <a:fld id="{A5D554F9-75DE-4C99-8500-C23B28C1AE66}" type="datetimeFigureOut">
               <a:rPr lang="en-US" smtClean="0"/>
-              <a:t>7/16/2025</a:t>
+              <a:t>7/17/2025</a:t>
             </a:fld>
             <a:endParaRPr lang="en-US"/>
           </a:p>
@@ -37447,7 +37448,7 @@
           <a:p>
             <a:fld id="{A5D554F9-75DE-4C99-8500-C23B28C1AE66}" type="datetimeFigureOut">
               <a:rPr lang="en-US" smtClean="0"/>
-              <a:t>7/16/2025</a:t>
+              <a:t>7/17/2025</a:t>
             </a:fld>
             <a:endParaRPr lang="en-US"/>
           </a:p>
@@ -38009,7 +38010,7 @@
           <a:noFill/>
           <a:extLst>
             <a:ext uri="{909E8E84-426E-40dd-AFC4-6F175D3DCCD1}">
-              <a14:hiddenFill xmlns="" xmlns:a14="http://schemas.microsoft.com/office/drawing/2010/main">
+              <a14:hiddenFill xmlns:a14="http://schemas.microsoft.com/office/drawing/2010/main" xmlns="">
                 <a:solidFill>
                   <a:srgbClr val="FFFFFF"/>
                 </a:solidFill>
@@ -38083,7 +38084,7 @@
               </a:ln>
               <a:extLst>
                 <a:ext uri="{91240B29-F687-4f45-9708-019B960494DF}">
-                  <a14:hiddenLine xmlns="" xmlns:a14="http://schemas.microsoft.com/office/drawing/2010/main" w="9525">
+                  <a14:hiddenLine xmlns:a14="http://schemas.microsoft.com/office/drawing/2010/main" xmlns="" w="9525">
                     <a:solidFill>
                       <a:srgbClr val="000000"/>
                     </a:solidFill>
@@ -38173,7 +38174,7 @@
               </a:ln>
               <a:extLst>
                 <a:ext uri="{91240B29-F687-4f45-9708-019B960494DF}">
-                  <a14:hiddenLine xmlns="" xmlns:a14="http://schemas.microsoft.com/office/drawing/2010/main" w="9525">
+                  <a14:hiddenLine xmlns:a14="http://schemas.microsoft.com/office/drawing/2010/main" xmlns="" w="9525">
                     <a:solidFill>
                       <a:srgbClr val="000000"/>
                     </a:solidFill>
@@ -38263,7 +38264,7 @@
               </a:ln>
               <a:extLst>
                 <a:ext uri="{91240B29-F687-4f45-9708-019B960494DF}">
-                  <a14:hiddenLine xmlns="" xmlns:a14="http://schemas.microsoft.com/office/drawing/2010/main" w="9525">
+                  <a14:hiddenLine xmlns:a14="http://schemas.microsoft.com/office/drawing/2010/main" xmlns="" w="9525">
                     <a:solidFill>
                       <a:srgbClr val="000000"/>
                     </a:solidFill>
@@ -38325,7 +38326,7 @@
               </a:ln>
               <a:extLst>
                 <a:ext uri="{91240B29-F687-4f45-9708-019B960494DF}">
-                  <a14:hiddenLine xmlns="" xmlns:a14="http://schemas.microsoft.com/office/drawing/2010/main" w="9525">
+                  <a14:hiddenLine xmlns:a14="http://schemas.microsoft.com/office/drawing/2010/main" xmlns="" w="9525">
                     <a:solidFill>
                       <a:srgbClr val="000000"/>
                     </a:solidFill>
@@ -38415,7 +38416,7 @@
               </a:ln>
               <a:extLst>
                 <a:ext uri="{91240B29-F687-4f45-9708-019B960494DF}">
-                  <a14:hiddenLine xmlns="" xmlns:a14="http://schemas.microsoft.com/office/drawing/2010/main" w="9525">
+                  <a14:hiddenLine xmlns:a14="http://schemas.microsoft.com/office/drawing/2010/main" xmlns="" w="9525">
                     <a:solidFill>
                       <a:srgbClr val="000000"/>
                     </a:solidFill>
@@ -38477,7 +38478,7 @@
               </a:ln>
               <a:extLst>
                 <a:ext uri="{91240B29-F687-4f45-9708-019B960494DF}">
-                  <a14:hiddenLine xmlns="" xmlns:a14="http://schemas.microsoft.com/office/drawing/2010/main" w="9525">
+                  <a14:hiddenLine xmlns:a14="http://schemas.microsoft.com/office/drawing/2010/main" xmlns="" w="9525">
                     <a:solidFill>
                       <a:srgbClr val="000000"/>
                     </a:solidFill>
@@ -38539,7 +38540,7 @@
               </a:ln>
               <a:extLst>
                 <a:ext uri="{91240B29-F687-4f45-9708-019B960494DF}">
-                  <a14:hiddenLine xmlns="" xmlns:a14="http://schemas.microsoft.com/office/drawing/2010/main" w="9525">
+                  <a14:hiddenLine xmlns:a14="http://schemas.microsoft.com/office/drawing/2010/main" xmlns="" w="9525">
                     <a:solidFill>
                       <a:srgbClr val="000000"/>
                     </a:solidFill>
@@ -38629,7 +38630,7 @@
               </a:ln>
               <a:extLst>
                 <a:ext uri="{91240B29-F687-4f45-9708-019B960494DF}">
-                  <a14:hiddenLine xmlns="" xmlns:a14="http://schemas.microsoft.com/office/drawing/2010/main" w="9525">
+                  <a14:hiddenLine xmlns:a14="http://schemas.microsoft.com/office/drawing/2010/main" xmlns="" w="9525">
                     <a:solidFill>
                       <a:srgbClr val="000000"/>
                     </a:solidFill>
@@ -38719,7 +38720,7 @@
               </a:ln>
               <a:extLst>
                 <a:ext uri="{91240B29-F687-4f45-9708-019B960494DF}">
-                  <a14:hiddenLine xmlns="" xmlns:a14="http://schemas.microsoft.com/office/drawing/2010/main" w="9525">
+                  <a14:hiddenLine xmlns:a14="http://schemas.microsoft.com/office/drawing/2010/main" xmlns="" w="9525">
                     <a:solidFill>
                       <a:srgbClr val="000000"/>
                     </a:solidFill>
@@ -38781,7 +38782,7 @@
               </a:ln>
               <a:extLst>
                 <a:ext uri="{91240B29-F687-4f45-9708-019B960494DF}">
-                  <a14:hiddenLine xmlns="" xmlns:a14="http://schemas.microsoft.com/office/drawing/2010/main" w="9525">
+                  <a14:hiddenLine xmlns:a14="http://schemas.microsoft.com/office/drawing/2010/main" xmlns="" w="9525">
                     <a:solidFill>
                       <a:srgbClr val="000000"/>
                     </a:solidFill>
@@ -38891,7 +38892,7 @@
               </a:ln>
               <a:extLst>
                 <a:ext uri="{91240B29-F687-4f45-9708-019B960494DF}">
-                  <a14:hiddenLine xmlns="" xmlns:a14="http://schemas.microsoft.com/office/drawing/2010/main" w="9525">
+                  <a14:hiddenLine xmlns:a14="http://schemas.microsoft.com/office/drawing/2010/main" xmlns="" w="9525">
                     <a:solidFill>
                       <a:srgbClr val="000000"/>
                     </a:solidFill>
@@ -38975,7 +38976,7 @@
               </a:ln>
               <a:extLst>
                 <a:ext uri="{91240B29-F687-4f45-9708-019B960494DF}">
-                  <a14:hiddenLine xmlns="" xmlns:a14="http://schemas.microsoft.com/office/drawing/2010/main" w="9525">
+                  <a14:hiddenLine xmlns:a14="http://schemas.microsoft.com/office/drawing/2010/main" xmlns="" w="9525">
                     <a:solidFill>
                       <a:srgbClr val="000000"/>
                     </a:solidFill>
@@ -39037,7 +39038,7 @@
               </a:ln>
               <a:extLst>
                 <a:ext uri="{91240B29-F687-4f45-9708-019B960494DF}">
-                  <a14:hiddenLine xmlns="" xmlns:a14="http://schemas.microsoft.com/office/drawing/2010/main" w="9525">
+                  <a14:hiddenLine xmlns:a14="http://schemas.microsoft.com/office/drawing/2010/main" xmlns="" w="9525">
                     <a:solidFill>
                       <a:srgbClr val="000000"/>
                     </a:solidFill>
@@ -39099,7 +39100,7 @@
               </a:ln>
               <a:extLst>
                 <a:ext uri="{91240B29-F687-4f45-9708-019B960494DF}">
-                  <a14:hiddenLine xmlns="" xmlns:a14="http://schemas.microsoft.com/office/drawing/2010/main" w="9525">
+                  <a14:hiddenLine xmlns:a14="http://schemas.microsoft.com/office/drawing/2010/main" xmlns="" w="9525">
                     <a:solidFill>
                       <a:srgbClr val="000000"/>
                     </a:solidFill>
@@ -39189,7 +39190,7 @@
               </a:ln>
               <a:extLst>
                 <a:ext uri="{91240B29-F687-4f45-9708-019B960494DF}">
-                  <a14:hiddenLine xmlns="" xmlns:a14="http://schemas.microsoft.com/office/drawing/2010/main" w="9525">
+                  <a14:hiddenLine xmlns:a14="http://schemas.microsoft.com/office/drawing/2010/main" xmlns="" w="9525">
                     <a:solidFill>
                       <a:srgbClr val="000000"/>
                     </a:solidFill>
@@ -39223,7 +39224,7 @@
               </a:ln>
               <a:extLst>
                 <a:ext uri="{91240B29-F687-4f45-9708-019B960494DF}">
-                  <a14:hiddenLine xmlns="" xmlns:a14="http://schemas.microsoft.com/office/drawing/2010/main" w="9525">
+                  <a14:hiddenLine xmlns:a14="http://schemas.microsoft.com/office/drawing/2010/main" xmlns="" w="9525">
                     <a:solidFill>
                       <a:srgbClr val="000000"/>
                     </a:solidFill>
@@ -39288,7 +39289,7 @@
               </a:ln>
               <a:extLst>
                 <a:ext uri="{91240B29-F687-4f45-9708-019B960494DF}">
-                  <a14:hiddenLine xmlns="" xmlns:a14="http://schemas.microsoft.com/office/drawing/2010/main" w="9525">
+                  <a14:hiddenLine xmlns:a14="http://schemas.microsoft.com/office/drawing/2010/main" xmlns="" w="9525">
                     <a:solidFill>
                       <a:srgbClr val="000000"/>
                     </a:solidFill>
@@ -39378,7 +39379,7 @@
               </a:ln>
               <a:extLst>
                 <a:ext uri="{91240B29-F687-4f45-9708-019B960494DF}">
-                  <a14:hiddenLine xmlns="" xmlns:a14="http://schemas.microsoft.com/office/drawing/2010/main" w="9525">
+                  <a14:hiddenLine xmlns:a14="http://schemas.microsoft.com/office/drawing/2010/main" xmlns="" w="9525">
                     <a:solidFill>
                       <a:srgbClr val="000000"/>
                     </a:solidFill>
@@ -39440,7 +39441,7 @@
               </a:ln>
               <a:extLst>
                 <a:ext uri="{91240B29-F687-4f45-9708-019B960494DF}">
-                  <a14:hiddenLine xmlns="" xmlns:a14="http://schemas.microsoft.com/office/drawing/2010/main" w="9525">
+                  <a14:hiddenLine xmlns:a14="http://schemas.microsoft.com/office/drawing/2010/main" xmlns="" w="9525">
                     <a:solidFill>
                       <a:srgbClr val="000000"/>
                     </a:solidFill>
@@ -39530,7 +39531,7 @@
               </a:ln>
               <a:extLst>
                 <a:ext uri="{91240B29-F687-4f45-9708-019B960494DF}">
-                  <a14:hiddenLine xmlns="" xmlns:a14="http://schemas.microsoft.com/office/drawing/2010/main" w="9525">
+                  <a14:hiddenLine xmlns:a14="http://schemas.microsoft.com/office/drawing/2010/main" xmlns="" w="9525">
                     <a:solidFill>
                       <a:srgbClr val="000000"/>
                     </a:solidFill>
@@ -39595,7 +39596,7 @@
               </a:ln>
               <a:extLst>
                 <a:ext uri="{91240B29-F687-4f45-9708-019B960494DF}">
-                  <a14:hiddenLine xmlns="" xmlns:a14="http://schemas.microsoft.com/office/drawing/2010/main" w="9525">
+                  <a14:hiddenLine xmlns:a14="http://schemas.microsoft.com/office/drawing/2010/main" xmlns="" w="9525">
                     <a:solidFill>
                       <a:srgbClr val="000000"/>
                     </a:solidFill>
@@ -39657,7 +39658,7 @@
               </a:ln>
               <a:extLst>
                 <a:ext uri="{91240B29-F687-4f45-9708-019B960494DF}">
-                  <a14:hiddenLine xmlns="" xmlns:a14="http://schemas.microsoft.com/office/drawing/2010/main" w="9525">
+                  <a14:hiddenLine xmlns:a14="http://schemas.microsoft.com/office/drawing/2010/main" xmlns="" w="9525">
                     <a:solidFill>
                       <a:srgbClr val="000000"/>
                     </a:solidFill>
@@ -39747,7 +39748,7 @@
               </a:ln>
               <a:extLst>
                 <a:ext uri="{91240B29-F687-4f45-9708-019B960494DF}">
-                  <a14:hiddenLine xmlns="" xmlns:a14="http://schemas.microsoft.com/office/drawing/2010/main" w="9525">
+                  <a14:hiddenLine xmlns:a14="http://schemas.microsoft.com/office/drawing/2010/main" xmlns="" w="9525">
                     <a:solidFill>
                       <a:srgbClr val="000000"/>
                     </a:solidFill>
@@ -39837,7 +39838,7 @@
               </a:ln>
               <a:extLst>
                 <a:ext uri="{91240B29-F687-4f45-9708-019B960494DF}">
-                  <a14:hiddenLine xmlns="" xmlns:a14="http://schemas.microsoft.com/office/drawing/2010/main" w="9525">
+                  <a14:hiddenLine xmlns:a14="http://schemas.microsoft.com/office/drawing/2010/main" xmlns="" w="9525">
                     <a:solidFill>
                       <a:srgbClr val="000000"/>
                     </a:solidFill>
@@ -39902,7 +39903,7 @@
               </a:ln>
               <a:extLst>
                 <a:ext uri="{91240B29-F687-4f45-9708-019B960494DF}">
-                  <a14:hiddenLine xmlns="" xmlns:a14="http://schemas.microsoft.com/office/drawing/2010/main" w="9525">
+                  <a14:hiddenLine xmlns:a14="http://schemas.microsoft.com/office/drawing/2010/main" xmlns="" w="9525">
                     <a:solidFill>
                       <a:srgbClr val="000000"/>
                     </a:solidFill>
@@ -40022,7 +40023,7 @@
               </a:ln>
               <a:extLst>
                 <a:ext uri="{91240B29-F687-4f45-9708-019B960494DF}">
-                  <a14:hiddenLine xmlns="" xmlns:a14="http://schemas.microsoft.com/office/drawing/2010/main" w="9525">
+                  <a14:hiddenLine xmlns:a14="http://schemas.microsoft.com/office/drawing/2010/main" xmlns="" w="9525">
                     <a:solidFill>
                       <a:srgbClr val="000000"/>
                     </a:solidFill>
@@ -40120,7 +40121,7 @@
               </a:ln>
               <a:extLst>
                 <a:ext uri="{91240B29-F687-4f45-9708-019B960494DF}">
-                  <a14:hiddenLine xmlns="" xmlns:a14="http://schemas.microsoft.com/office/drawing/2010/main" w="9525">
+                  <a14:hiddenLine xmlns:a14="http://schemas.microsoft.com/office/drawing/2010/main" xmlns="" w="9525">
                     <a:solidFill>
                       <a:srgbClr val="000000"/>
                     </a:solidFill>
@@ -40235,7 +40236,7 @@
               </a:ln>
               <a:extLst>
                 <a:ext uri="{91240B29-F687-4f45-9708-019B960494DF}">
-                  <a14:hiddenLine xmlns="" xmlns:a14="http://schemas.microsoft.com/office/drawing/2010/main" w="9525">
+                  <a14:hiddenLine xmlns:a14="http://schemas.microsoft.com/office/drawing/2010/main" xmlns="" w="9525">
                     <a:solidFill>
                       <a:srgbClr val="000000"/>
                     </a:solidFill>
@@ -40325,7 +40326,7 @@
               </a:ln>
               <a:extLst>
                 <a:ext uri="{91240B29-F687-4f45-9708-019B960494DF}">
-                  <a14:hiddenLine xmlns="" xmlns:a14="http://schemas.microsoft.com/office/drawing/2010/main" w="9525">
+                  <a14:hiddenLine xmlns:a14="http://schemas.microsoft.com/office/drawing/2010/main" xmlns="" w="9525">
                     <a:solidFill>
                       <a:srgbClr val="000000"/>
                     </a:solidFill>
@@ -40390,7 +40391,7 @@
               </a:ln>
               <a:extLst>
                 <a:ext uri="{91240B29-F687-4f45-9708-019B960494DF}">
-                  <a14:hiddenLine xmlns="" xmlns:a14="http://schemas.microsoft.com/office/drawing/2010/main" w="9525">
+                  <a14:hiddenLine xmlns:a14="http://schemas.microsoft.com/office/drawing/2010/main" xmlns="" w="9525">
                     <a:solidFill>
                       <a:srgbClr val="000000"/>
                     </a:solidFill>
@@ -40480,7 +40481,7 @@
               </a:ln>
               <a:extLst>
                 <a:ext uri="{91240B29-F687-4f45-9708-019B960494DF}">
-                  <a14:hiddenLine xmlns="" xmlns:a14="http://schemas.microsoft.com/office/drawing/2010/main" w="9525">
+                  <a14:hiddenLine xmlns:a14="http://schemas.microsoft.com/office/drawing/2010/main" xmlns="" w="9525">
                     <a:solidFill>
                       <a:srgbClr val="000000"/>
                     </a:solidFill>
@@ -40548,7 +40549,7 @@
               </a:ln>
               <a:extLst>
                 <a:ext uri="{91240B29-F687-4f45-9708-019B960494DF}">
-                  <a14:hiddenLine xmlns="" xmlns:a14="http://schemas.microsoft.com/office/drawing/2010/main" w="9525">
+                  <a14:hiddenLine xmlns:a14="http://schemas.microsoft.com/office/drawing/2010/main" xmlns="" w="9525">
                     <a:solidFill>
                       <a:srgbClr val="000000"/>
                     </a:solidFill>
@@ -40638,7 +40639,7 @@
               </a:ln>
               <a:extLst>
                 <a:ext uri="{91240B29-F687-4f45-9708-019B960494DF}">
-                  <a14:hiddenLine xmlns="" xmlns:a14="http://schemas.microsoft.com/office/drawing/2010/main" w="9525">
+                  <a14:hiddenLine xmlns:a14="http://schemas.microsoft.com/office/drawing/2010/main" xmlns="" w="9525">
                     <a:solidFill>
                       <a:srgbClr val="000000"/>
                     </a:solidFill>
@@ -40706,7 +40707,7 @@
               </a:ln>
               <a:extLst>
                 <a:ext uri="{91240B29-F687-4f45-9708-019B960494DF}">
-                  <a14:hiddenLine xmlns="" xmlns:a14="http://schemas.microsoft.com/office/drawing/2010/main" w="9525">
+                  <a14:hiddenLine xmlns:a14="http://schemas.microsoft.com/office/drawing/2010/main" xmlns="" w="9525">
                     <a:solidFill>
                       <a:srgbClr val="000000"/>
                     </a:solidFill>
@@ -40796,7 +40797,7 @@
               </a:ln>
               <a:extLst>
                 <a:ext uri="{91240B29-F687-4f45-9708-019B960494DF}">
-                  <a14:hiddenLine xmlns="" xmlns:a14="http://schemas.microsoft.com/office/drawing/2010/main" w="9525">
+                  <a14:hiddenLine xmlns:a14="http://schemas.microsoft.com/office/drawing/2010/main" xmlns="" w="9525">
                     <a:solidFill>
                       <a:srgbClr val="000000"/>
                     </a:solidFill>
@@ -40830,7 +40831,7 @@
               </a:ln>
               <a:extLst>
                 <a:ext uri="{91240B29-F687-4f45-9708-019B960494DF}">
-                  <a14:hiddenLine xmlns="" xmlns:a14="http://schemas.microsoft.com/office/drawing/2010/main" w="9525">
+                  <a14:hiddenLine xmlns:a14="http://schemas.microsoft.com/office/drawing/2010/main" xmlns="" w="9525">
                     <a:solidFill>
                       <a:srgbClr val="000000"/>
                     </a:solidFill>
@@ -40970,7 +40971,7 @@
           <a:p>
             <a:fld id="{A5D554F9-75DE-4C99-8500-C23B28C1AE66}" type="datetimeFigureOut">
               <a:rPr lang="en-US" smtClean="0"/>
-              <a:t>7/16/2025</a:t>
+              <a:t>7/17/2025</a:t>
             </a:fld>
             <a:endParaRPr lang="en-US"/>
           </a:p>
@@ -42782,6 +42783,355 @@
       </p:transition>
     </mc:Fallback>
   </mc:AlternateContent>
+</p:sld>
+</file>
+
+<file path=ppt/slides/slide9.xml><?xml version="1.0" encoding="utf-8"?>
+<p:sld xmlns:a="http://schemas.openxmlformats.org/drawingml/2006/main" xmlns:r="http://schemas.openxmlformats.org/officeDocument/2006/relationships" xmlns:p="http://schemas.openxmlformats.org/presentationml/2006/main">
+  <p:cSld>
+    <p:spTree>
+      <p:nvGrpSpPr>
+        <p:cNvPr id="1" name=""/>
+        <p:cNvGrpSpPr/>
+        <p:nvPr/>
+      </p:nvGrpSpPr>
+      <p:grpSpPr>
+        <a:xfrm>
+          <a:off x="0" y="0"/>
+          <a:ext cx="0" cy="0"/>
+          <a:chOff x="0" y="0"/>
+          <a:chExt cx="0" cy="0"/>
+        </a:xfrm>
+      </p:grpSpPr>
+      <p:sp>
+        <p:nvSpPr>
+          <p:cNvPr id="2" name="Title 1">
+            <a:extLst>
+              <a:ext uri="{FF2B5EF4-FFF2-40B4-BE49-F238E27FC236}">
+                <a16:creationId xmlns:a16="http://schemas.microsoft.com/office/drawing/2014/main" id="{D4A5BB67-98D8-6E7A-F8E8-F883646857D1}"/>
+              </a:ext>
+            </a:extLst>
+          </p:cNvPr>
+          <p:cNvSpPr>
+            <a:spLocks noGrp="1"/>
+          </p:cNvSpPr>
+          <p:nvPr>
+            <p:ph type="title"/>
+          </p:nvPr>
+        </p:nvSpPr>
+        <p:spPr/>
+        <p:txBody>
+          <a:bodyPr>
+            <a:normAutofit/>
+          </a:bodyPr>
+          <a:lstStyle/>
+          <a:p>
+            <a:r>
+              <a:rPr lang="en-US" sz="4000" dirty="0"/>
+              <a:t>Conclusion</a:t>
+            </a:r>
+          </a:p>
+        </p:txBody>
+      </p:sp>
+      <p:sp>
+        <p:nvSpPr>
+          <p:cNvPr id="3" name="Content Placeholder 2">
+            <a:extLst>
+              <a:ext uri="{FF2B5EF4-FFF2-40B4-BE49-F238E27FC236}">
+                <a16:creationId xmlns:a16="http://schemas.microsoft.com/office/drawing/2014/main" id="{75C4B3D6-5AB8-FC7A-99E8-A8F5A796DC9F}"/>
+              </a:ext>
+            </a:extLst>
+          </p:cNvPr>
+          <p:cNvSpPr>
+            <a:spLocks noGrp="1"/>
+          </p:cNvSpPr>
+          <p:nvPr>
+            <p:ph idx="1"/>
+          </p:nvPr>
+        </p:nvSpPr>
+        <p:spPr/>
+        <p:txBody>
+          <a:bodyPr/>
+          <a:lstStyle/>
+          <a:p>
+            <a:r>
+              <a:rPr lang="en-US" sz="2400" dirty="0"/>
+              <a:t>Student Hub is a simple, offline student management system designed for small institutions. It ensures secure, role-based access where students can view grades and report issues, while teachers manage grades. </a:t>
+            </a:r>
+          </a:p>
+          <a:p>
+            <a:r>
+              <a:rPr lang="en-US" sz="2400" dirty="0"/>
+              <a:t>Built with Node.js, Express, and SQLite, it prioritizes privacy and local data control. Though limited in online features, it offers a solid, scalable foundation for future upgrades like multi-user support and advanced security</a:t>
+            </a:r>
+            <a:r>
+              <a:rPr lang="en-US" dirty="0"/>
+              <a:t>.</a:t>
+            </a:r>
+          </a:p>
+        </p:txBody>
+      </p:sp>
+    </p:spTree>
+    <p:extLst>
+      <p:ext uri="{BB962C8B-B14F-4D97-AF65-F5344CB8AC3E}">
+        <p14:creationId xmlns:p14="http://schemas.microsoft.com/office/powerpoint/2010/main" val="481765844"/>
+      </p:ext>
+    </p:extLst>
+  </p:cSld>
+  <p:clrMapOvr>
+    <a:masterClrMapping/>
+  </p:clrMapOvr>
+  <mc:AlternateContent xmlns:mc="http://schemas.openxmlformats.org/markup-compatibility/2006">
+    <mc:Choice xmlns:p14="http://schemas.microsoft.com/office/powerpoint/2010/main" Requires="p14">
+      <p:transition spd="slow" p14:dur="1500">
+        <p:split orient="vert"/>
+      </p:transition>
+    </mc:Choice>
+    <mc:Fallback>
+      <p:transition spd="slow">
+        <p:split orient="vert"/>
+      </p:transition>
+    </mc:Fallback>
+  </mc:AlternateContent>
+  <p:timing>
+    <p:tnLst>
+      <p:par>
+        <p:cTn id="1" dur="indefinite" restart="never" nodeType="tmRoot">
+          <p:childTnLst>
+            <p:seq concurrent="1" nextAc="seek">
+              <p:cTn id="2" dur="indefinite" nodeType="mainSeq">
+                <p:childTnLst>
+                  <p:par>
+                    <p:cTn id="3" fill="hold">
+                      <p:stCondLst>
+                        <p:cond delay="indefinite"/>
+                      </p:stCondLst>
+                      <p:childTnLst>
+                        <p:par>
+                          <p:cTn id="4" fill="hold">
+                            <p:stCondLst>
+                              <p:cond delay="0"/>
+                            </p:stCondLst>
+                            <p:childTnLst>
+                              <p:par>
+                                <p:cTn id="5" presetID="2" presetClass="entr" presetSubtype="4" fill="hold" grpId="0" nodeType="clickEffect">
+                                  <p:stCondLst>
+                                    <p:cond delay="0"/>
+                                  </p:stCondLst>
+                                  <p:childTnLst>
+                                    <p:set>
+                                      <p:cBhvr>
+                                        <p:cTn id="6" dur="1" fill="hold">
+                                          <p:stCondLst>
+                                            <p:cond delay="0"/>
+                                          </p:stCondLst>
+                                        </p:cTn>
+                                        <p:tgtEl>
+                                          <p:spTgt spid="3">
+                                            <p:txEl>
+                                              <p:pRg st="0" end="0"/>
+                                            </p:txEl>
+                                          </p:spTgt>
+                                        </p:tgtEl>
+                                        <p:attrNameLst>
+                                          <p:attrName>style.visibility</p:attrName>
+                                        </p:attrNameLst>
+                                      </p:cBhvr>
+                                      <p:to>
+                                        <p:strVal val="visible"/>
+                                      </p:to>
+                                    </p:set>
+                                    <p:anim calcmode="lin" valueType="num">
+                                      <p:cBhvr additive="base">
+                                        <p:cTn id="7" dur="500" fill="hold"/>
+                                        <p:tgtEl>
+                                          <p:spTgt spid="3">
+                                            <p:txEl>
+                                              <p:pRg st="0" end="0"/>
+                                            </p:txEl>
+                                          </p:spTgt>
+                                        </p:tgtEl>
+                                        <p:attrNameLst>
+                                          <p:attrName>ppt_x</p:attrName>
+                                        </p:attrNameLst>
+                                      </p:cBhvr>
+                                      <p:tavLst>
+                                        <p:tav tm="0">
+                                          <p:val>
+                                            <p:strVal val="#ppt_x"/>
+                                          </p:val>
+                                        </p:tav>
+                                        <p:tav tm="100000">
+                                          <p:val>
+                                            <p:strVal val="#ppt_x"/>
+                                          </p:val>
+                                        </p:tav>
+                                      </p:tavLst>
+                                    </p:anim>
+                                    <p:anim calcmode="lin" valueType="num">
+                                      <p:cBhvr additive="base">
+                                        <p:cTn id="8" dur="500" fill="hold"/>
+                                        <p:tgtEl>
+                                          <p:spTgt spid="3">
+                                            <p:txEl>
+                                              <p:pRg st="0" end="0"/>
+                                            </p:txEl>
+                                          </p:spTgt>
+                                        </p:tgtEl>
+                                        <p:attrNameLst>
+                                          <p:attrName>ppt_y</p:attrName>
+                                        </p:attrNameLst>
+                                      </p:cBhvr>
+                                      <p:tavLst>
+                                        <p:tav tm="0">
+                                          <p:val>
+                                            <p:strVal val="1+#ppt_h/2"/>
+                                          </p:val>
+                                        </p:tav>
+                                        <p:tav tm="100000">
+                                          <p:val>
+                                            <p:strVal val="#ppt_y"/>
+                                          </p:val>
+                                        </p:tav>
+                                      </p:tavLst>
+                                    </p:anim>
+                                  </p:childTnLst>
+                                </p:cTn>
+                              </p:par>
+                            </p:childTnLst>
+                          </p:cTn>
+                        </p:par>
+                      </p:childTnLst>
+                    </p:cTn>
+                  </p:par>
+                  <p:par>
+                    <p:cTn id="9" fill="hold">
+                      <p:stCondLst>
+                        <p:cond delay="indefinite"/>
+                      </p:stCondLst>
+                      <p:childTnLst>
+                        <p:par>
+                          <p:cTn id="10" fill="hold">
+                            <p:stCondLst>
+                              <p:cond delay="0"/>
+                            </p:stCondLst>
+                            <p:childTnLst>
+                              <p:par>
+                                <p:cTn id="11" presetID="2" presetClass="entr" presetSubtype="4" fill="hold" grpId="0" nodeType="clickEffect">
+                                  <p:stCondLst>
+                                    <p:cond delay="0"/>
+                                  </p:stCondLst>
+                                  <p:childTnLst>
+                                    <p:set>
+                                      <p:cBhvr>
+                                        <p:cTn id="12" dur="1" fill="hold">
+                                          <p:stCondLst>
+                                            <p:cond delay="0"/>
+                                          </p:stCondLst>
+                                        </p:cTn>
+                                        <p:tgtEl>
+                                          <p:spTgt spid="3">
+                                            <p:txEl>
+                                              <p:pRg st="1" end="1"/>
+                                            </p:txEl>
+                                          </p:spTgt>
+                                        </p:tgtEl>
+                                        <p:attrNameLst>
+                                          <p:attrName>style.visibility</p:attrName>
+                                        </p:attrNameLst>
+                                      </p:cBhvr>
+                                      <p:to>
+                                        <p:strVal val="visible"/>
+                                      </p:to>
+                                    </p:set>
+                                    <p:anim calcmode="lin" valueType="num">
+                                      <p:cBhvr additive="base">
+                                        <p:cTn id="13" dur="500" fill="hold"/>
+                                        <p:tgtEl>
+                                          <p:spTgt spid="3">
+                                            <p:txEl>
+                                              <p:pRg st="1" end="1"/>
+                                            </p:txEl>
+                                          </p:spTgt>
+                                        </p:tgtEl>
+                                        <p:attrNameLst>
+                                          <p:attrName>ppt_x</p:attrName>
+                                        </p:attrNameLst>
+                                      </p:cBhvr>
+                                      <p:tavLst>
+                                        <p:tav tm="0">
+                                          <p:val>
+                                            <p:strVal val="#ppt_x"/>
+                                          </p:val>
+                                        </p:tav>
+                                        <p:tav tm="100000">
+                                          <p:val>
+                                            <p:strVal val="#ppt_x"/>
+                                          </p:val>
+                                        </p:tav>
+                                      </p:tavLst>
+                                    </p:anim>
+                                    <p:anim calcmode="lin" valueType="num">
+                                      <p:cBhvr additive="base">
+                                        <p:cTn id="14" dur="500" fill="hold"/>
+                                        <p:tgtEl>
+                                          <p:spTgt spid="3">
+                                            <p:txEl>
+                                              <p:pRg st="1" end="1"/>
+                                            </p:txEl>
+                                          </p:spTgt>
+                                        </p:tgtEl>
+                                        <p:attrNameLst>
+                                          <p:attrName>ppt_y</p:attrName>
+                                        </p:attrNameLst>
+                                      </p:cBhvr>
+                                      <p:tavLst>
+                                        <p:tav tm="0">
+                                          <p:val>
+                                            <p:strVal val="1+#ppt_h/2"/>
+                                          </p:val>
+                                        </p:tav>
+                                        <p:tav tm="100000">
+                                          <p:val>
+                                            <p:strVal val="#ppt_y"/>
+                                          </p:val>
+                                        </p:tav>
+                                      </p:tavLst>
+                                    </p:anim>
+                                  </p:childTnLst>
+                                </p:cTn>
+                              </p:par>
+                            </p:childTnLst>
+                          </p:cTn>
+                        </p:par>
+                      </p:childTnLst>
+                    </p:cTn>
+                  </p:par>
+                </p:childTnLst>
+              </p:cTn>
+              <p:prevCondLst>
+                <p:cond evt="onPrev" delay="0">
+                  <p:tgtEl>
+                    <p:sldTgt/>
+                  </p:tgtEl>
+                </p:cond>
+              </p:prevCondLst>
+              <p:nextCondLst>
+                <p:cond evt="onNext" delay="0">
+                  <p:tgtEl>
+                    <p:sldTgt/>
+                  </p:tgtEl>
+                </p:cond>
+              </p:nextCondLst>
+            </p:seq>
+          </p:childTnLst>
+        </p:cTn>
+      </p:par>
+    </p:tnLst>
+    <p:bldLst>
+      <p:bldP spid="3" grpId="0" build="p"/>
+    </p:bldLst>
+  </p:timing>
 </p:sld>
 </file>
 

</xml_diff>